<commit_message>
snp matrix and pca for b_vulgatus.
</commit_message>
<xml_diff>
--- a/Summary/20210209_demo_for_ccgb_rotation_update.pptx
+++ b/Summary/20210209_demo_for_ccgb_rotation_update.pptx
@@ -5,7 +5,7 @@
     <p:sldMasterId id="2147483648" r:id="rId1"/>
   </p:sldMasterIdLst>
   <p:notesMasterIdLst>
-    <p:notesMasterId r:id="rId12"/>
+    <p:notesMasterId r:id="rId15"/>
   </p:notesMasterIdLst>
   <p:sldIdLst>
     <p:sldId id="256" r:id="rId2"/>
@@ -16,8 +16,11 @@
     <p:sldId id="291" r:id="rId7"/>
     <p:sldId id="293" r:id="rId8"/>
     <p:sldId id="294" r:id="rId9"/>
-    <p:sldId id="278" r:id="rId10"/>
-    <p:sldId id="273" r:id="rId11"/>
+    <p:sldId id="298" r:id="rId10"/>
+    <p:sldId id="296" r:id="rId11"/>
+    <p:sldId id="299" r:id="rId12"/>
+    <p:sldId id="278" r:id="rId13"/>
+    <p:sldId id="273" r:id="rId14"/>
   </p:sldIdLst>
   <p:sldSz cx="12192000" cy="6858000"/>
   <p:notesSz cx="6858000" cy="9144000"/>
@@ -129,6 +132,9 @@
             <p14:sldId id="291"/>
             <p14:sldId id="293"/>
             <p14:sldId id="294"/>
+            <p14:sldId id="298"/>
+            <p14:sldId id="296"/>
+            <p14:sldId id="299"/>
             <p14:sldId id="278"/>
             <p14:sldId id="273"/>
           </p14:sldIdLst>
@@ -809,6 +815,174 @@
             <a:fld id="{9D984E8B-8157-4976-ABDF-6DA2CAC3440F}" type="slidenum">
               <a:rPr lang="en-US" smtClean="0"/>
               <a:t>9</a:t>
+            </a:fld>
+            <a:endParaRPr lang="en-US"/>
+          </a:p>
+        </p:txBody>
+      </p:sp>
+    </p:spTree>
+    <p:extLst>
+      <p:ext uri="{BB962C8B-B14F-4D97-AF65-F5344CB8AC3E}">
+        <p14:creationId xmlns:p14="http://schemas.microsoft.com/office/powerpoint/2010/main" val="1402379873"/>
+      </p:ext>
+    </p:extLst>
+  </p:cSld>
+  <p:clrMapOvr>
+    <a:masterClrMapping/>
+  </p:clrMapOvr>
+</p:notes>
+</file>
+
+<file path=ppt/notesSlides/notesSlide5.xml><?xml version="1.0" encoding="utf-8"?>
+<p:notes xmlns:a="http://schemas.openxmlformats.org/drawingml/2006/main" xmlns:r="http://schemas.openxmlformats.org/officeDocument/2006/relationships" xmlns:p="http://schemas.openxmlformats.org/presentationml/2006/main">
+  <p:cSld>
+    <p:spTree>
+      <p:nvGrpSpPr>
+        <p:cNvPr id="1" name=""/>
+        <p:cNvGrpSpPr/>
+        <p:nvPr/>
+      </p:nvGrpSpPr>
+      <p:grpSpPr>
+        <a:xfrm>
+          <a:off x="0" y="0"/>
+          <a:ext cx="0" cy="0"/>
+          <a:chOff x="0" y="0"/>
+          <a:chExt cx="0" cy="0"/>
+        </a:xfrm>
+      </p:grpSpPr>
+      <p:sp>
+        <p:nvSpPr>
+          <p:cNvPr id="2" name="Slide Image Placeholder 1"/>
+          <p:cNvSpPr>
+            <a:spLocks noGrp="1" noRot="1" noChangeAspect="1"/>
+          </p:cNvSpPr>
+          <p:nvPr>
+            <p:ph type="sldImg"/>
+          </p:nvPr>
+        </p:nvSpPr>
+        <p:spPr/>
+      </p:sp>
+      <p:sp>
+        <p:nvSpPr>
+          <p:cNvPr id="3" name="Notes Placeholder 2"/>
+          <p:cNvSpPr>
+            <a:spLocks noGrp="1"/>
+          </p:cNvSpPr>
+          <p:nvPr>
+            <p:ph type="body" idx="1"/>
+          </p:nvPr>
+        </p:nvSpPr>
+        <p:spPr/>
+        <p:txBody>
+          <a:bodyPr/>
+          <a:lstStyle/>
+          <a:p>
+            <a:endParaRPr lang="en-US" dirty="0"/>
+          </a:p>
+        </p:txBody>
+      </p:sp>
+      <p:sp>
+        <p:nvSpPr>
+          <p:cNvPr id="4" name="Slide Number Placeholder 3"/>
+          <p:cNvSpPr>
+            <a:spLocks noGrp="1"/>
+          </p:cNvSpPr>
+          <p:nvPr>
+            <p:ph type="sldNum" sz="quarter" idx="5"/>
+          </p:nvPr>
+        </p:nvSpPr>
+        <p:spPr/>
+        <p:txBody>
+          <a:bodyPr/>
+          <a:lstStyle/>
+          <a:p>
+            <a:fld id="{9D984E8B-8157-4976-ABDF-6DA2CAC3440F}" type="slidenum">
+              <a:rPr lang="en-US" smtClean="0"/>
+              <a:t>10</a:t>
+            </a:fld>
+            <a:endParaRPr lang="en-US"/>
+          </a:p>
+        </p:txBody>
+      </p:sp>
+    </p:spTree>
+    <p:extLst>
+      <p:ext uri="{BB962C8B-B14F-4D97-AF65-F5344CB8AC3E}">
+        <p14:creationId xmlns:p14="http://schemas.microsoft.com/office/powerpoint/2010/main" val="1296520410"/>
+      </p:ext>
+    </p:extLst>
+  </p:cSld>
+  <p:clrMapOvr>
+    <a:masterClrMapping/>
+  </p:clrMapOvr>
+</p:notes>
+</file>
+
+<file path=ppt/notesSlides/notesSlide6.xml><?xml version="1.0" encoding="utf-8"?>
+<p:notes xmlns:a="http://schemas.openxmlformats.org/drawingml/2006/main" xmlns:r="http://schemas.openxmlformats.org/officeDocument/2006/relationships" xmlns:p="http://schemas.openxmlformats.org/presentationml/2006/main">
+  <p:cSld>
+    <p:spTree>
+      <p:nvGrpSpPr>
+        <p:cNvPr id="1" name=""/>
+        <p:cNvGrpSpPr/>
+        <p:nvPr/>
+      </p:nvGrpSpPr>
+      <p:grpSpPr>
+        <a:xfrm>
+          <a:off x="0" y="0"/>
+          <a:ext cx="0" cy="0"/>
+          <a:chOff x="0" y="0"/>
+          <a:chExt cx="0" cy="0"/>
+        </a:xfrm>
+      </p:grpSpPr>
+      <p:sp>
+        <p:nvSpPr>
+          <p:cNvPr id="2" name="Slide Image Placeholder 1"/>
+          <p:cNvSpPr>
+            <a:spLocks noGrp="1" noRot="1" noChangeAspect="1"/>
+          </p:cNvSpPr>
+          <p:nvPr>
+            <p:ph type="sldImg"/>
+          </p:nvPr>
+        </p:nvSpPr>
+        <p:spPr/>
+      </p:sp>
+      <p:sp>
+        <p:nvSpPr>
+          <p:cNvPr id="3" name="Notes Placeholder 2"/>
+          <p:cNvSpPr>
+            <a:spLocks noGrp="1"/>
+          </p:cNvSpPr>
+          <p:nvPr>
+            <p:ph type="body" idx="1"/>
+          </p:nvPr>
+        </p:nvSpPr>
+        <p:spPr/>
+        <p:txBody>
+          <a:bodyPr/>
+          <a:lstStyle/>
+          <a:p>
+            <a:endParaRPr lang="en-US" dirty="0"/>
+          </a:p>
+        </p:txBody>
+      </p:sp>
+      <p:sp>
+        <p:nvSpPr>
+          <p:cNvPr id="4" name="Slide Number Placeholder 3"/>
+          <p:cNvSpPr>
+            <a:spLocks noGrp="1"/>
+          </p:cNvSpPr>
+          <p:nvPr>
+            <p:ph type="sldNum" sz="quarter" idx="5"/>
+          </p:nvPr>
+        </p:nvSpPr>
+        <p:spPr/>
+        <p:txBody>
+          <a:bodyPr/>
+          <a:lstStyle/>
+          <a:p>
+            <a:fld id="{9D984E8B-8157-4976-ABDF-6DA2CAC3440F}" type="slidenum">
+              <a:rPr lang="en-US" smtClean="0"/>
+              <a:t>12</a:t>
             </a:fld>
             <a:endParaRPr lang="en-US"/>
           </a:p>
@@ -4202,6 +4376,805 @@
           <p:cNvPr id="2" name="Title 1">
             <a:extLst>
               <a:ext uri="{FF2B5EF4-FFF2-40B4-BE49-F238E27FC236}">
+                <a16:creationId xmlns:a16="http://schemas.microsoft.com/office/drawing/2014/main" id="{65D628C1-80CE-412C-8D99-87265F8BBF5F}"/>
+              </a:ext>
+            </a:extLst>
+          </p:cNvPr>
+          <p:cNvSpPr>
+            <a:spLocks noGrp="1"/>
+          </p:cNvSpPr>
+          <p:nvPr>
+            <p:ph type="title"/>
+          </p:nvPr>
+        </p:nvSpPr>
+        <p:spPr/>
+        <p:txBody>
+          <a:bodyPr/>
+          <a:lstStyle/>
+          <a:p>
+            <a:r>
+              <a:rPr lang="en-US" dirty="0">
+                <a:latin typeface="Yu Gothic" panose="020B0400000000000000" pitchFamily="34" charset="-128"/>
+                <a:ea typeface="Yu Gothic" panose="020B0400000000000000" pitchFamily="34" charset="-128"/>
+              </a:rPr>
+              <a:t>Implementation plan (for PCA)</a:t>
+            </a:r>
+          </a:p>
+        </p:txBody>
+      </p:sp>
+      <p:sp>
+        <p:nvSpPr>
+          <p:cNvPr id="3" name="TextBox 2">
+            <a:extLst>
+              <a:ext uri="{FF2B5EF4-FFF2-40B4-BE49-F238E27FC236}">
+                <a16:creationId xmlns:a16="http://schemas.microsoft.com/office/drawing/2014/main" id="{FAB4FB15-19E2-4133-A4BC-3310B730AD65}"/>
+              </a:ext>
+            </a:extLst>
+          </p:cNvPr>
+          <p:cNvSpPr txBox="1"/>
+          <p:nvPr/>
+        </p:nvSpPr>
+        <p:spPr>
+          <a:xfrm>
+            <a:off x="0" y="1564623"/>
+            <a:ext cx="12321002" cy="4832092"/>
+          </a:xfrm>
+          <a:prstGeom prst="rect">
+            <a:avLst/>
+          </a:prstGeom>
+          <a:noFill/>
+        </p:spPr>
+        <p:txBody>
+          <a:bodyPr wrap="none" rtlCol="0">
+            <a:spAutoFit/>
+          </a:bodyPr>
+          <a:lstStyle/>
+          <a:p>
+            <a:r>
+              <a:rPr lang="en-US" sz="1400" dirty="0">
+                <a:solidFill>
+                  <a:prstClr val="black"/>
+                </a:solidFill>
+                <a:latin typeface="Yu Gothic" panose="020B0400000000000000" pitchFamily="34" charset="-128"/>
+                <a:ea typeface="Yu Gothic" panose="020B0400000000000000" pitchFamily="34" charset="-128"/>
+              </a:rPr>
+              <a:t>This is example input with </a:t>
+            </a:r>
+            <a:r>
+              <a:rPr lang="en-US" sz="1400" dirty="0" err="1">
+                <a:solidFill>
+                  <a:prstClr val="black"/>
+                </a:solidFill>
+                <a:latin typeface="Yu Gothic" panose="020B0400000000000000" pitchFamily="34" charset="-128"/>
+                <a:ea typeface="Yu Gothic" panose="020B0400000000000000" pitchFamily="34" charset="-128"/>
+              </a:rPr>
+              <a:t>Phascolarctobacterium_succinatutens</a:t>
+            </a:r>
+            <a:endParaRPr lang="en-US" sz="1400" dirty="0">
+              <a:solidFill>
+                <a:prstClr val="black"/>
+              </a:solidFill>
+              <a:latin typeface="Yu Gothic" panose="020B0400000000000000" pitchFamily="34" charset="-128"/>
+              <a:ea typeface="Yu Gothic" panose="020B0400000000000000" pitchFamily="34" charset="-128"/>
+            </a:endParaRPr>
+          </a:p>
+          <a:p>
+            <a:endParaRPr lang="en-US" sz="1400" dirty="0">
+              <a:solidFill>
+                <a:prstClr val="black"/>
+              </a:solidFill>
+              <a:latin typeface="Lucida Console" panose="020B0609040504020204" pitchFamily="49" charset="0"/>
+            </a:endParaRPr>
+          </a:p>
+          <a:p>
+            <a:r>
+              <a:rPr lang="en-US" sz="1400" dirty="0">
+                <a:solidFill>
+                  <a:prstClr val="black"/>
+                </a:solidFill>
+                <a:latin typeface="Lucida Console" panose="020B0609040504020204" pitchFamily="49" charset="0"/>
+              </a:rPr>
+              <a:t>given input as:</a:t>
+            </a:r>
+          </a:p>
+          <a:p>
+            <a:r>
+              <a:rPr lang="en-US" sz="1400" dirty="0" err="1">
+                <a:solidFill>
+                  <a:prstClr val="black"/>
+                </a:solidFill>
+                <a:latin typeface="Lucida Console" panose="020B0609040504020204" pitchFamily="49" charset="0"/>
+              </a:rPr>
+              <a:t>site_id</a:t>
+            </a:r>
+            <a:r>
+              <a:rPr lang="en-US" sz="1400" dirty="0">
+                <a:solidFill>
+                  <a:prstClr val="black"/>
+                </a:solidFill>
+                <a:latin typeface="Lucida Console" panose="020B0609040504020204" pitchFamily="49" charset="0"/>
+              </a:rPr>
+              <a:t> 700021824       700033665       700038158       700101366       700111296c      700163628       700164192</a:t>
+            </a:r>
+          </a:p>
+          <a:p>
+            <a:r>
+              <a:rPr lang="en-US" sz="1400" dirty="0">
+                <a:solidFill>
+                  <a:prstClr val="black"/>
+                </a:solidFill>
+                <a:latin typeface="Lucida Console" panose="020B0609040504020204" pitchFamily="49" charset="0"/>
+              </a:rPr>
+              <a:t>NZ_GL830844|162|626939.3.peg.2|2D|R|1   0,13    0,2     0,13    0,3     0,0     0,10    0,9</a:t>
+            </a:r>
+          </a:p>
+          <a:p>
+            <a:r>
+              <a:rPr lang="en-US" sz="1400" dirty="0">
+                <a:solidFill>
+                  <a:prstClr val="black"/>
+                </a:solidFill>
+                <a:latin typeface="Lucida Console" panose="020B0609040504020204" pitchFamily="49" charset="0"/>
+              </a:rPr>
+              <a:t>NZ_GL830844|163|626939.3.peg.2|2D|R|1   0,13    0,2     0,13    0,3     0,0     0,10    0,9</a:t>
+            </a:r>
+          </a:p>
+          <a:p>
+            <a:r>
+              <a:rPr lang="en-US" sz="1400" dirty="0">
+                <a:solidFill>
+                  <a:prstClr val="black"/>
+                </a:solidFill>
+                <a:latin typeface="Lucida Console" panose="020B0609040504020204" pitchFamily="49" charset="0"/>
+              </a:rPr>
+              <a:t>NZ_GL830844|164|626939.3.peg.2|1D|R|1   0,12    0,2     0,14    0,2     0,0     0,9     0,9</a:t>
+            </a:r>
+          </a:p>
+          <a:p>
+            <a:r>
+              <a:rPr lang="en-US" sz="1400" dirty="0">
+                <a:solidFill>
+                  <a:prstClr val="black"/>
+                </a:solidFill>
+                <a:latin typeface="Lucida Console" panose="020B0609040504020204" pitchFamily="49" charset="0"/>
+              </a:rPr>
+              <a:t>NZ_GL830844|165|626939.3.peg.2|2D|R|9.999e-05   0,12    0,2     0,14    0,3     0,0     </a:t>
+            </a:r>
+            <a:r>
+              <a:rPr lang="en-US" sz="1400" dirty="0">
+                <a:solidFill>
+                  <a:prstClr val="black"/>
+                </a:solidFill>
+                <a:highlight>
+                  <a:srgbClr val="FFFF00"/>
+                </a:highlight>
+                <a:latin typeface="Lucida Console" panose="020B0609040504020204" pitchFamily="49" charset="0"/>
+              </a:rPr>
+              <a:t>9,9</a:t>
+            </a:r>
+            <a:r>
+              <a:rPr lang="en-US" sz="1400" dirty="0">
+                <a:solidFill>
+                  <a:prstClr val="black"/>
+                </a:solidFill>
+                <a:latin typeface="Lucida Console" panose="020B0609040504020204" pitchFamily="49" charset="0"/>
+              </a:rPr>
+              <a:t>     0,9</a:t>
+            </a:r>
+          </a:p>
+          <a:p>
+            <a:r>
+              <a:rPr lang="en-US" sz="1400" dirty="0">
+                <a:solidFill>
+                  <a:prstClr val="black"/>
+                </a:solidFill>
+                <a:latin typeface="Lucida Console" panose="020B0609040504020204" pitchFamily="49" charset="0"/>
+              </a:rPr>
+              <a:t>…</a:t>
+            </a:r>
+          </a:p>
+          <a:p>
+            <a:r>
+              <a:rPr lang="en-US" sz="1400" dirty="0">
+                <a:solidFill>
+                  <a:prstClr val="black"/>
+                </a:solidFill>
+                <a:latin typeface="Lucida Console" panose="020B0609040504020204" pitchFamily="49" charset="0"/>
+              </a:rPr>
+              <a:t>NZ_GL830844|195|626939.3.peg.2|2D|R|9.999e-05   </a:t>
+            </a:r>
+            <a:r>
+              <a:rPr lang="en-US" sz="1400" dirty="0">
+                <a:solidFill>
+                  <a:prstClr val="black"/>
+                </a:solidFill>
+                <a:highlight>
+                  <a:srgbClr val="FFFF00"/>
+                </a:highlight>
+                <a:latin typeface="Lucida Console" panose="020B0609040504020204" pitchFamily="49" charset="0"/>
+              </a:rPr>
+              <a:t>17,17   5,5     15,15   5,5</a:t>
+            </a:r>
+            <a:r>
+              <a:rPr lang="en-US" sz="1400" dirty="0">
+                <a:solidFill>
+                  <a:prstClr val="black"/>
+                </a:solidFill>
+                <a:latin typeface="Lucida Console" panose="020B0609040504020204" pitchFamily="49" charset="0"/>
+              </a:rPr>
+              <a:t>     0,0     </a:t>
+            </a:r>
+            <a:r>
+              <a:rPr lang="en-US" sz="1400" dirty="0">
+                <a:solidFill>
+                  <a:prstClr val="black"/>
+                </a:solidFill>
+                <a:highlight>
+                  <a:srgbClr val="FFFF00"/>
+                </a:highlight>
+                <a:latin typeface="Lucida Console" panose="020B0609040504020204" pitchFamily="49" charset="0"/>
+              </a:rPr>
+              <a:t>13,13   8,8</a:t>
+            </a:r>
+          </a:p>
+          <a:p>
+            <a:r>
+              <a:rPr lang="en-US" sz="1400" dirty="0">
+                <a:solidFill>
+                  <a:prstClr val="black"/>
+                </a:solidFill>
+                <a:latin typeface="Lucida Console" panose="020B0609040504020204" pitchFamily="49" charset="0"/>
+              </a:rPr>
+              <a:t>…</a:t>
+            </a:r>
+          </a:p>
+          <a:p>
+            <a:r>
+              <a:rPr lang="en-US" sz="1400" dirty="0">
+                <a:solidFill>
+                  <a:prstClr val="black"/>
+                </a:solidFill>
+                <a:latin typeface="Lucida Console" panose="020B0609040504020204" pitchFamily="49" charset="0"/>
+              </a:rPr>
+              <a:t>NZ_GL830844|234|626939.3.peg.2|2D|R|9.999e-05   0,16    0,3     0,21    0,4     0,51    </a:t>
+            </a:r>
+            <a:r>
+              <a:rPr lang="en-US" sz="1400" dirty="0">
+                <a:solidFill>
+                  <a:prstClr val="black"/>
+                </a:solidFill>
+                <a:highlight>
+                  <a:srgbClr val="FFFF00"/>
+                </a:highlight>
+                <a:latin typeface="Lucida Console" panose="020B0609040504020204" pitchFamily="49" charset="0"/>
+              </a:rPr>
+              <a:t>12,12</a:t>
+            </a:r>
+            <a:r>
+              <a:rPr lang="en-US" sz="1400" dirty="0">
+                <a:solidFill>
+                  <a:prstClr val="black"/>
+                </a:solidFill>
+                <a:latin typeface="Lucida Console" panose="020B0609040504020204" pitchFamily="49" charset="0"/>
+              </a:rPr>
+              <a:t>   0,7</a:t>
+            </a:r>
+          </a:p>
+          <a:p>
+            <a:r>
+              <a:rPr lang="en-US" sz="1400" dirty="0">
+                <a:solidFill>
+                  <a:prstClr val="black"/>
+                </a:solidFill>
+                <a:latin typeface="Lucida Console" panose="020B0609040504020204" pitchFamily="49" charset="0"/>
+              </a:rPr>
+              <a:t>…</a:t>
+            </a:r>
+          </a:p>
+          <a:p>
+            <a:r>
+              <a:rPr lang="en-US" sz="1400" dirty="0">
+                <a:solidFill>
+                  <a:prstClr val="black"/>
+                </a:solidFill>
+                <a:latin typeface="Lucida Console" panose="020B0609040504020204" pitchFamily="49" charset="0"/>
+              </a:rPr>
+              <a:t>NZ_GL830844|278|626939.3.peg.2|1D|R|0.0069993   0,12    0,3     0,22    0,4     0,19    0,10    2,7</a:t>
+            </a:r>
+          </a:p>
+          <a:p>
+            <a:endParaRPr lang="en-US" sz="1400" dirty="0">
+              <a:solidFill>
+                <a:prstClr val="black"/>
+              </a:solidFill>
+              <a:latin typeface="Lucida Console" panose="020B0609040504020204" pitchFamily="49" charset="0"/>
+            </a:endParaRPr>
+          </a:p>
+          <a:p>
+            <a:endParaRPr lang="en-US" sz="1400" dirty="0">
+              <a:solidFill>
+                <a:prstClr val="black"/>
+              </a:solidFill>
+              <a:latin typeface="Lucida Console" panose="020B0609040504020204" pitchFamily="49" charset="0"/>
+            </a:endParaRPr>
+          </a:p>
+          <a:p>
+            <a:r>
+              <a:rPr lang="en-US" sz="1400" dirty="0">
+                <a:solidFill>
+                  <a:prstClr val="black"/>
+                </a:solidFill>
+                <a:latin typeface="Lucida Console" panose="020B0609040504020204" pitchFamily="49" charset="0"/>
+              </a:rPr>
+              <a:t>results in output as:</a:t>
+            </a:r>
+          </a:p>
+          <a:p>
+            <a:r>
+              <a:rPr lang="en-US" sz="1400" dirty="0">
+                <a:solidFill>
+                  <a:prstClr val="black"/>
+                </a:solidFill>
+                <a:latin typeface="Lucida Console" panose="020B0609040504020204" pitchFamily="49" charset="0"/>
+              </a:rPr>
+              <a:t>700021824, 700033665, 700038158, 700101366, 700111296c, 700163628, 700164192</a:t>
+            </a:r>
+          </a:p>
+          <a:p>
+            <a:r>
+              <a:rPr lang="en-US" sz="1400" dirty="0">
+                <a:solidFill>
+                  <a:prstClr val="black"/>
+                </a:solidFill>
+                <a:latin typeface="Lucida Console" panose="020B0609040504020204" pitchFamily="49" charset="0"/>
+              </a:rPr>
+              <a:t>0, 0, 0, 0, 0, </a:t>
+            </a:r>
+            <a:r>
+              <a:rPr lang="en-US" sz="1400" dirty="0">
+                <a:solidFill>
+                  <a:prstClr val="black"/>
+                </a:solidFill>
+                <a:highlight>
+                  <a:srgbClr val="FFFF00"/>
+                </a:highlight>
+                <a:latin typeface="Lucida Console" panose="020B0609040504020204" pitchFamily="49" charset="0"/>
+              </a:rPr>
+              <a:t>1,</a:t>
+            </a:r>
+            <a:r>
+              <a:rPr lang="en-US" sz="1400" dirty="0">
+                <a:solidFill>
+                  <a:prstClr val="black"/>
+                </a:solidFill>
+                <a:latin typeface="Lucida Console" panose="020B0609040504020204" pitchFamily="49" charset="0"/>
+              </a:rPr>
+              <a:t> 0</a:t>
+            </a:r>
+          </a:p>
+          <a:p>
+            <a:r>
+              <a:rPr lang="en-US" sz="1400" dirty="0">
+                <a:solidFill>
+                  <a:prstClr val="black"/>
+                </a:solidFill>
+                <a:highlight>
+                  <a:srgbClr val="FFFF00"/>
+                </a:highlight>
+                <a:latin typeface="Lucida Console" panose="020B0609040504020204" pitchFamily="49" charset="0"/>
+              </a:rPr>
+              <a:t>1, 1, 1, 1,</a:t>
+            </a:r>
+            <a:r>
+              <a:rPr lang="en-US" sz="1400" dirty="0">
+                <a:solidFill>
+                  <a:prstClr val="black"/>
+                </a:solidFill>
+                <a:latin typeface="Lucida Console" panose="020B0609040504020204" pitchFamily="49" charset="0"/>
+              </a:rPr>
+              <a:t> 0, </a:t>
+            </a:r>
+            <a:r>
+              <a:rPr lang="en-US" sz="1400" dirty="0">
+                <a:solidFill>
+                  <a:prstClr val="black"/>
+                </a:solidFill>
+                <a:highlight>
+                  <a:srgbClr val="FFFF00"/>
+                </a:highlight>
+                <a:latin typeface="Lucida Console" panose="020B0609040504020204" pitchFamily="49" charset="0"/>
+              </a:rPr>
+              <a:t>1, 1</a:t>
+            </a:r>
+          </a:p>
+          <a:p>
+            <a:r>
+              <a:rPr lang="en-US" sz="1400" dirty="0">
+                <a:solidFill>
+                  <a:prstClr val="black"/>
+                </a:solidFill>
+                <a:latin typeface="Lucida Console" panose="020B0609040504020204" pitchFamily="49" charset="0"/>
+              </a:rPr>
+              <a:t>0, 0, 0, 0, 0, </a:t>
+            </a:r>
+            <a:r>
+              <a:rPr lang="en-US" sz="1400" dirty="0">
+                <a:solidFill>
+                  <a:prstClr val="black"/>
+                </a:solidFill>
+                <a:highlight>
+                  <a:srgbClr val="FFFF00"/>
+                </a:highlight>
+                <a:latin typeface="Lucida Console" panose="020B0609040504020204" pitchFamily="49" charset="0"/>
+              </a:rPr>
+              <a:t>1,</a:t>
+            </a:r>
+            <a:r>
+              <a:rPr lang="en-US" sz="1400" dirty="0">
+                <a:solidFill>
+                  <a:prstClr val="black"/>
+                </a:solidFill>
+                <a:latin typeface="Lucida Console" panose="020B0609040504020204" pitchFamily="49" charset="0"/>
+              </a:rPr>
+              <a:t> 0</a:t>
+            </a:r>
+          </a:p>
+          <a:p>
+            <a:r>
+              <a:rPr lang="en-US" sz="1400" dirty="0">
+                <a:solidFill>
+                  <a:prstClr val="black"/>
+                </a:solidFill>
+                <a:latin typeface="Lucida Console" panose="020B0609040504020204" pitchFamily="49" charset="0"/>
+              </a:rPr>
+              <a:t>0, 0, 0, 0, 0, 0, 0</a:t>
+            </a:r>
+          </a:p>
+        </p:txBody>
+      </p:sp>
+    </p:spTree>
+    <p:extLst>
+      <p:ext uri="{BB962C8B-B14F-4D97-AF65-F5344CB8AC3E}">
+        <p14:creationId xmlns:p14="http://schemas.microsoft.com/office/powerpoint/2010/main" val="3721008250"/>
+      </p:ext>
+    </p:extLst>
+  </p:cSld>
+  <p:clrMapOvr>
+    <a:masterClrMapping/>
+  </p:clrMapOvr>
+</p:sld>
+</file>
+
+<file path=ppt/slides/slide11.xml><?xml version="1.0" encoding="utf-8"?>
+<p:sld xmlns:a="http://schemas.openxmlformats.org/drawingml/2006/main" xmlns:r="http://schemas.openxmlformats.org/officeDocument/2006/relationships" xmlns:p="http://schemas.openxmlformats.org/presentationml/2006/main">
+  <p:cSld>
+    <p:spTree>
+      <p:nvGrpSpPr>
+        <p:cNvPr id="1" name=""/>
+        <p:cNvGrpSpPr/>
+        <p:nvPr/>
+      </p:nvGrpSpPr>
+      <p:grpSpPr>
+        <a:xfrm>
+          <a:off x="0" y="0"/>
+          <a:ext cx="0" cy="0"/>
+          <a:chOff x="0" y="0"/>
+          <a:chExt cx="0" cy="0"/>
+        </a:xfrm>
+      </p:grpSpPr>
+      <p:sp>
+        <p:nvSpPr>
+          <p:cNvPr id="2" name="Title 1">
+            <a:extLst>
+              <a:ext uri="{FF2B5EF4-FFF2-40B4-BE49-F238E27FC236}">
+                <a16:creationId xmlns:a16="http://schemas.microsoft.com/office/drawing/2014/main" id="{FCF76A6E-09F9-40D8-989E-F4E540C896BB}"/>
+              </a:ext>
+            </a:extLst>
+          </p:cNvPr>
+          <p:cNvSpPr>
+            <a:spLocks noGrp="1"/>
+          </p:cNvSpPr>
+          <p:nvPr>
+            <p:ph type="title"/>
+          </p:nvPr>
+        </p:nvSpPr>
+        <p:spPr/>
+        <p:txBody>
+          <a:bodyPr/>
+          <a:lstStyle/>
+          <a:p>
+            <a:r>
+              <a:rPr lang="en-US" dirty="0">
+                <a:latin typeface="Yu Gothic" panose="020B0400000000000000" pitchFamily="34" charset="-128"/>
+                <a:ea typeface="Yu Gothic" panose="020B0400000000000000" pitchFamily="34" charset="-128"/>
+              </a:rPr>
+              <a:t>Results</a:t>
+            </a:r>
+          </a:p>
+        </p:txBody>
+      </p:sp>
+      <p:pic>
+        <p:nvPicPr>
+          <p:cNvPr id="5" name="Content Placeholder 4" descr="Chart, scatter chart&#10;&#10;Description automatically generated">
+            <a:extLst>
+              <a:ext uri="{FF2B5EF4-FFF2-40B4-BE49-F238E27FC236}">
+                <a16:creationId xmlns:a16="http://schemas.microsoft.com/office/drawing/2014/main" id="{441FE4C7-4CB5-4A96-8F7B-788DBAEA11E3}"/>
+              </a:ext>
+            </a:extLst>
+          </p:cNvPr>
+          <p:cNvPicPr>
+            <a:picLocks noGrp="1" noChangeAspect="1"/>
+          </p:cNvPicPr>
+          <p:nvPr>
+            <p:ph idx="1"/>
+          </p:nvPr>
+        </p:nvPicPr>
+        <p:blipFill>
+          <a:blip r:embed="rId2">
+            <a:extLst>
+              <a:ext uri="{28A0092B-C50C-407E-A947-70E740481C1C}">
+                <a14:useLocalDpi xmlns:a14="http://schemas.microsoft.com/office/drawing/2010/main" val="0"/>
+              </a:ext>
+            </a:extLst>
+          </a:blip>
+          <a:stretch>
+            <a:fillRect/>
+          </a:stretch>
+        </p:blipFill>
+        <p:spPr>
+          <a:xfrm>
+            <a:off x="4645729" y="1501161"/>
+            <a:ext cx="6400826" cy="4351338"/>
+          </a:xfrm>
+        </p:spPr>
+      </p:pic>
+      <p:sp>
+        <p:nvSpPr>
+          <p:cNvPr id="6" name="TextBox 5">
+            <a:extLst>
+              <a:ext uri="{FF2B5EF4-FFF2-40B4-BE49-F238E27FC236}">
+                <a16:creationId xmlns:a16="http://schemas.microsoft.com/office/drawing/2014/main" id="{95D0C310-C071-429D-8ADB-ACE3C8443A5D}"/>
+              </a:ext>
+            </a:extLst>
+          </p:cNvPr>
+          <p:cNvSpPr txBox="1"/>
+          <p:nvPr/>
+        </p:nvSpPr>
+        <p:spPr>
+          <a:xfrm>
+            <a:off x="474406" y="1690688"/>
+            <a:ext cx="4302781" cy="1477328"/>
+          </a:xfrm>
+          <a:prstGeom prst="rect">
+            <a:avLst/>
+          </a:prstGeom>
+          <a:noFill/>
+        </p:spPr>
+        <p:txBody>
+          <a:bodyPr wrap="none" rtlCol="0">
+            <a:spAutoFit/>
+          </a:bodyPr>
+          <a:lstStyle/>
+          <a:p>
+            <a:r>
+              <a:rPr lang="en-US" dirty="0">
+                <a:latin typeface="Yu Gothic" panose="020B0400000000000000" pitchFamily="34" charset="-128"/>
+                <a:ea typeface="Yu Gothic" panose="020B0400000000000000" pitchFamily="34" charset="-128"/>
+              </a:rPr>
+              <a:t>Here is what the PCA looks like for </a:t>
+            </a:r>
+          </a:p>
+          <a:p>
+            <a:r>
+              <a:rPr lang="en-US" sz="1800" dirty="0" err="1">
+                <a:solidFill>
+                  <a:prstClr val="black"/>
+                </a:solidFill>
+                <a:latin typeface="Yu Gothic" panose="020B0400000000000000" pitchFamily="34" charset="-128"/>
+                <a:ea typeface="Yu Gothic" panose="020B0400000000000000" pitchFamily="34" charset="-128"/>
+              </a:rPr>
+              <a:t>Phascolarctobacterium_succinatutens</a:t>
+            </a:r>
+            <a:r>
+              <a:rPr lang="en-US" sz="1800" dirty="0">
+                <a:solidFill>
+                  <a:prstClr val="black"/>
+                </a:solidFill>
+                <a:latin typeface="Yu Gothic" panose="020B0400000000000000" pitchFamily="34" charset="-128"/>
+                <a:ea typeface="Yu Gothic" panose="020B0400000000000000" pitchFamily="34" charset="-128"/>
+              </a:rPr>
+              <a:t>.</a:t>
+            </a:r>
+          </a:p>
+          <a:p>
+            <a:endParaRPr lang="en-US" dirty="0">
+              <a:solidFill>
+                <a:prstClr val="black"/>
+              </a:solidFill>
+              <a:latin typeface="Yu Gothic" panose="020B0400000000000000" pitchFamily="34" charset="-128"/>
+              <a:ea typeface="Yu Gothic" panose="020B0400000000000000" pitchFamily="34" charset="-128"/>
+            </a:endParaRPr>
+          </a:p>
+          <a:p>
+            <a:r>
+              <a:rPr lang="en-US" dirty="0">
+                <a:solidFill>
+                  <a:prstClr val="black"/>
+                </a:solidFill>
+                <a:latin typeface="Yu Gothic" panose="020B0400000000000000" pitchFamily="34" charset="-128"/>
+                <a:ea typeface="Yu Gothic" panose="020B0400000000000000" pitchFamily="34" charset="-128"/>
+              </a:rPr>
+              <a:t>Note that this was a really sparse data</a:t>
+            </a:r>
+          </a:p>
+          <a:p>
+            <a:r>
+              <a:rPr lang="en-US" dirty="0">
+                <a:solidFill>
+                  <a:prstClr val="black"/>
+                </a:solidFill>
+                <a:latin typeface="Yu Gothic" panose="020B0400000000000000" pitchFamily="34" charset="-128"/>
+                <a:ea typeface="Yu Gothic" panose="020B0400000000000000" pitchFamily="34" charset="-128"/>
+              </a:rPr>
+              <a:t>set that I used </a:t>
+            </a:r>
+            <a:r>
+              <a:rPr lang="en-US">
+                <a:solidFill>
+                  <a:prstClr val="black"/>
+                </a:solidFill>
+                <a:latin typeface="Yu Gothic" panose="020B0400000000000000" pitchFamily="34" charset="-128"/>
+                <a:ea typeface="Yu Gothic" panose="020B0400000000000000" pitchFamily="34" charset="-128"/>
+              </a:rPr>
+              <a:t>for testing.</a:t>
+            </a:r>
+            <a:endParaRPr lang="en-US" dirty="0">
+              <a:solidFill>
+                <a:prstClr val="black"/>
+              </a:solidFill>
+              <a:latin typeface="Yu Gothic" panose="020B0400000000000000" pitchFamily="34" charset="-128"/>
+              <a:ea typeface="Yu Gothic" panose="020B0400000000000000" pitchFamily="34" charset="-128"/>
+            </a:endParaRPr>
+          </a:p>
+        </p:txBody>
+      </p:sp>
+    </p:spTree>
+    <p:extLst>
+      <p:ext uri="{BB962C8B-B14F-4D97-AF65-F5344CB8AC3E}">
+        <p14:creationId xmlns:p14="http://schemas.microsoft.com/office/powerpoint/2010/main" val="3010393464"/>
+      </p:ext>
+    </p:extLst>
+  </p:cSld>
+  <p:clrMapOvr>
+    <a:masterClrMapping/>
+  </p:clrMapOvr>
+</p:sld>
+</file>
+
+<file path=ppt/slides/slide12.xml><?xml version="1.0" encoding="utf-8"?>
+<p:sld xmlns:a="http://schemas.openxmlformats.org/drawingml/2006/main" xmlns:r="http://schemas.openxmlformats.org/officeDocument/2006/relationships" xmlns:p="http://schemas.openxmlformats.org/presentationml/2006/main">
+  <p:cSld>
+    <p:spTree>
+      <p:nvGrpSpPr>
+        <p:cNvPr id="1" name=""/>
+        <p:cNvGrpSpPr/>
+        <p:nvPr/>
+      </p:nvGrpSpPr>
+      <p:grpSpPr>
+        <a:xfrm>
+          <a:off x="0" y="0"/>
+          <a:ext cx="0" cy="0"/>
+          <a:chOff x="0" y="0"/>
+          <a:chExt cx="0" cy="0"/>
+        </a:xfrm>
+      </p:grpSpPr>
+      <p:sp>
+        <p:nvSpPr>
+          <p:cNvPr id="2" name="Title 1">
+            <a:extLst>
+              <a:ext uri="{FF2B5EF4-FFF2-40B4-BE49-F238E27FC236}">
+                <a16:creationId xmlns:a16="http://schemas.microsoft.com/office/drawing/2014/main" id="{1DA4FD9C-0575-4672-BDCF-805449EFAC7C}"/>
+              </a:ext>
+            </a:extLst>
+          </p:cNvPr>
+          <p:cNvSpPr>
+            <a:spLocks noGrp="1"/>
+          </p:cNvSpPr>
+          <p:nvPr>
+            <p:ph type="title"/>
+          </p:nvPr>
+        </p:nvSpPr>
+        <p:spPr/>
+        <p:txBody>
+          <a:bodyPr/>
+          <a:lstStyle/>
+          <a:p>
+            <a:r>
+              <a:rPr lang="en-US" dirty="0"/>
+              <a:t>//TODO</a:t>
+            </a:r>
+          </a:p>
+        </p:txBody>
+      </p:sp>
+      <p:sp>
+        <p:nvSpPr>
+          <p:cNvPr id="3" name="Content Placeholder 2">
+            <a:extLst>
+              <a:ext uri="{FF2B5EF4-FFF2-40B4-BE49-F238E27FC236}">
+                <a16:creationId xmlns:a16="http://schemas.microsoft.com/office/drawing/2014/main" id="{B7017510-3A51-4778-BB7F-0F91AE0D6F96}"/>
+              </a:ext>
+            </a:extLst>
+          </p:cNvPr>
+          <p:cNvSpPr>
+            <a:spLocks noGrp="1"/>
+          </p:cNvSpPr>
+          <p:nvPr>
+            <p:ph idx="1"/>
+          </p:nvPr>
+        </p:nvSpPr>
+        <p:spPr/>
+        <p:txBody>
+          <a:bodyPr>
+            <a:normAutofit/>
+          </a:bodyPr>
+          <a:lstStyle/>
+          <a:p>
+            <a:r>
+              <a:rPr lang="en-US" dirty="0">
+                <a:latin typeface="Yu Gothic" panose="020B0400000000000000" pitchFamily="34" charset="-128"/>
+                <a:ea typeface="Yu Gothic" panose="020B0400000000000000" pitchFamily="34" charset="-128"/>
+                <a:sym typeface="Wingdings" panose="05000000000000000000" pitchFamily="2" charset="2"/>
+              </a:rPr>
+              <a:t>Finish implementing PCA over microbiome data</a:t>
+            </a:r>
+          </a:p>
+          <a:p>
+            <a:r>
+              <a:rPr lang="en-US" dirty="0">
+                <a:latin typeface="Yu Gothic" panose="020B0400000000000000" pitchFamily="34" charset="-128"/>
+                <a:ea typeface="Yu Gothic" panose="020B0400000000000000" pitchFamily="34" charset="-128"/>
+                <a:sym typeface="Wingdings" panose="05000000000000000000" pitchFamily="2" charset="2"/>
+              </a:rPr>
+              <a:t>Run MIDAS on downloaded data.</a:t>
+            </a:r>
+          </a:p>
+        </p:txBody>
+      </p:sp>
+    </p:spTree>
+    <p:extLst>
+      <p:ext uri="{BB962C8B-B14F-4D97-AF65-F5344CB8AC3E}">
+        <p14:creationId xmlns:p14="http://schemas.microsoft.com/office/powerpoint/2010/main" val="1230404432"/>
+      </p:ext>
+    </p:extLst>
+  </p:cSld>
+  <p:clrMapOvr>
+    <a:masterClrMapping/>
+  </p:clrMapOvr>
+</p:sld>
+</file>
+
+<file path=ppt/slides/slide13.xml><?xml version="1.0" encoding="utf-8"?>
+<p:sld xmlns:a="http://schemas.openxmlformats.org/drawingml/2006/main" xmlns:r="http://schemas.openxmlformats.org/officeDocument/2006/relationships" xmlns:p="http://schemas.openxmlformats.org/presentationml/2006/main">
+  <p:cSld>
+    <p:spTree>
+      <p:nvGrpSpPr>
+        <p:cNvPr id="1" name=""/>
+        <p:cNvGrpSpPr/>
+        <p:nvPr/>
+      </p:nvGrpSpPr>
+      <p:grpSpPr>
+        <a:xfrm>
+          <a:off x="0" y="0"/>
+          <a:ext cx="0" cy="0"/>
+          <a:chOff x="0" y="0"/>
+          <a:chExt cx="0" cy="0"/>
+        </a:xfrm>
+      </p:grpSpPr>
+      <p:sp>
+        <p:nvSpPr>
+          <p:cNvPr id="2" name="Title 1">
+            <a:extLst>
+              <a:ext uri="{FF2B5EF4-FFF2-40B4-BE49-F238E27FC236}">
                 <a16:creationId xmlns:a16="http://schemas.microsoft.com/office/drawing/2014/main" id="{1DA4FD9C-0575-4672-BDCF-805449EFAC7C}"/>
               </a:ext>
             </a:extLst>
@@ -6421,28 +7394,7 @@
                 </a:solidFill>
                 <a:latin typeface="Lucida Console" panose="020B0609040504020204" pitchFamily="49" charset="0"/>
               </a:rPr>
-              <a:t>NZ_GL830844|165|626939.3.peg.2|2D|R|9.999e-05   0,12    0,2     0,14    0,3     0,0     </a:t>
-            </a:r>
-            <a:r>
-              <a:rPr lang="en-US" sz="1400" dirty="0">
-                <a:solidFill>
-                  <a:prstClr val="black"/>
-                </a:solidFill>
-                <a:highlight>
-                  <a:srgbClr val="FFFF00"/>
-                </a:highlight>
-                <a:latin typeface="Lucida Console" panose="020B0609040504020204" pitchFamily="49" charset="0"/>
-              </a:rPr>
-              <a:t>9,9</a:t>
-            </a:r>
-            <a:r>
-              <a:rPr lang="en-US" sz="1400" dirty="0">
-                <a:solidFill>
-                  <a:prstClr val="black"/>
-                </a:solidFill>
-                <a:latin typeface="Lucida Console" panose="020B0609040504020204" pitchFamily="49" charset="0"/>
-              </a:rPr>
-              <a:t>     0,9</a:t>
+              <a:t>NZ_GL830844|165|626939.3.peg.2|2D|R|9.999e-05   0,12    0,2     0,14    0,3     0,0     9,9     0,9</a:t>
             </a:r>
           </a:p>
           <a:p>
@@ -6677,7 +7629,7 @@
           <p:cNvPr id="2" name="Title 1">
             <a:extLst>
               <a:ext uri="{FF2B5EF4-FFF2-40B4-BE49-F238E27FC236}">
-                <a16:creationId xmlns:a16="http://schemas.microsoft.com/office/drawing/2014/main" id="{1DA4FD9C-0575-4672-BDCF-805449EFAC7C}"/>
+                <a16:creationId xmlns:a16="http://schemas.microsoft.com/office/drawing/2014/main" id="{65D628C1-80CE-412C-8D99-87265F8BBF5F}"/>
               </a:ext>
             </a:extLst>
           </p:cNvPr>
@@ -6691,55 +7643,232 @@
         <p:spPr/>
         <p:txBody>
           <a:bodyPr/>
-          <a:lstStyle/>
-          <a:p>
-            <a:r>
-              <a:rPr lang="en-US" dirty="0"/>
-              <a:t>//TODO</a:t>
-            </a:r>
-          </a:p>
-        </p:txBody>
-      </p:sp>
-      <p:sp>
-        <p:nvSpPr>
-          <p:cNvPr id="3" name="Content Placeholder 2">
-            <a:extLst>
-              <a:ext uri="{FF2B5EF4-FFF2-40B4-BE49-F238E27FC236}">
-                <a16:creationId xmlns:a16="http://schemas.microsoft.com/office/drawing/2014/main" id="{B7017510-3A51-4778-BB7F-0F91AE0D6F96}"/>
-              </a:ext>
-            </a:extLst>
-          </p:cNvPr>
-          <p:cNvSpPr>
-            <a:spLocks noGrp="1"/>
-          </p:cNvSpPr>
-          <p:nvPr>
-            <p:ph idx="1"/>
-          </p:nvPr>
-        </p:nvSpPr>
-        <p:spPr/>
-        <p:txBody>
-          <a:bodyPr>
-            <a:normAutofit/>
-          </a:bodyPr>
           <a:lstStyle/>
           <a:p>
             <a:r>
               <a:rPr lang="en-US" dirty="0">
                 <a:latin typeface="Yu Gothic" panose="020B0400000000000000" pitchFamily="34" charset="-128"/>
                 <a:ea typeface="Yu Gothic" panose="020B0400000000000000" pitchFamily="34" charset="-128"/>
-                <a:sym typeface="Wingdings" panose="05000000000000000000" pitchFamily="2" charset="2"/>
-              </a:rPr>
-              <a:t>Finish implementing PCA over microbiome data</a:t>
-            </a:r>
+              </a:rPr>
+              <a:t>Implementation plan (for PCA)</a:t>
+            </a:r>
+          </a:p>
+        </p:txBody>
+      </p:sp>
+      <p:sp>
+        <p:nvSpPr>
+          <p:cNvPr id="3" name="TextBox 2">
+            <a:extLst>
+              <a:ext uri="{FF2B5EF4-FFF2-40B4-BE49-F238E27FC236}">
+                <a16:creationId xmlns:a16="http://schemas.microsoft.com/office/drawing/2014/main" id="{FAB4FB15-19E2-4133-A4BC-3310B730AD65}"/>
+              </a:ext>
+            </a:extLst>
+          </p:cNvPr>
+          <p:cNvSpPr txBox="1"/>
+          <p:nvPr/>
+        </p:nvSpPr>
+        <p:spPr>
+          <a:xfrm>
+            <a:off x="953728" y="1476134"/>
+            <a:ext cx="10661893" cy="3970318"/>
+          </a:xfrm>
+          <a:prstGeom prst="rect">
+            <a:avLst/>
+          </a:prstGeom>
+          <a:noFill/>
+        </p:spPr>
+        <p:txBody>
+          <a:bodyPr wrap="none" rtlCol="0">
+            <a:spAutoFit/>
+          </a:bodyPr>
+          <a:lstStyle/>
+          <a:p>
+            <a:r>
+              <a:rPr lang="en-US" dirty="0">
+                <a:solidFill>
+                  <a:prstClr val="black"/>
+                </a:solidFill>
+                <a:latin typeface="Lucida Console" panose="020B0609040504020204" pitchFamily="49" charset="0"/>
+              </a:rPr>
+              <a:t>For first line in input:</a:t>
+            </a:r>
+          </a:p>
+          <a:p>
+            <a:r>
+              <a:rPr lang="en-US" dirty="0">
+                <a:solidFill>
+                  <a:prstClr val="black"/>
+                </a:solidFill>
+                <a:latin typeface="Lucida Console" panose="020B0609040504020204" pitchFamily="49" charset="0"/>
+              </a:rPr>
+              <a:t>	</a:t>
+            </a:r>
+            <a:r>
+              <a:rPr lang="en-US" dirty="0" err="1">
+                <a:solidFill>
+                  <a:prstClr val="black"/>
+                </a:solidFill>
+                <a:latin typeface="Lucida Console" panose="020B0609040504020204" pitchFamily="49" charset="0"/>
+              </a:rPr>
+              <a:t>line.split</a:t>
+            </a:r>
+            <a:r>
+              <a:rPr lang="en-US" dirty="0">
+                <a:solidFill>
+                  <a:prstClr val="black"/>
+                </a:solidFill>
+                <a:latin typeface="Lucida Console" panose="020B0609040504020204" pitchFamily="49" charset="0"/>
+              </a:rPr>
+              <a:t>(1:n) is individuals</a:t>
+            </a:r>
+          </a:p>
+          <a:p>
+            <a:r>
+              <a:rPr lang="en-US" dirty="0">
+                <a:solidFill>
+                  <a:prstClr val="black"/>
+                </a:solidFill>
+                <a:latin typeface="Lucida Console" panose="020B0609040504020204" pitchFamily="49" charset="0"/>
+              </a:rPr>
+              <a:t>for each line in input:</a:t>
+            </a:r>
+          </a:p>
+          <a:p>
+            <a:r>
+              <a:rPr lang="en-US" dirty="0">
+                <a:solidFill>
+                  <a:prstClr val="black"/>
+                </a:solidFill>
+                <a:latin typeface="Lucida Console" panose="020B0609040504020204" pitchFamily="49" charset="0"/>
+              </a:rPr>
+              <a:t>	</a:t>
+            </a:r>
+            <a:r>
+              <a:rPr lang="en-US" dirty="0" err="1">
+                <a:solidFill>
+                  <a:prstClr val="black"/>
+                </a:solidFill>
+                <a:latin typeface="Lucida Console" panose="020B0609040504020204" pitchFamily="49" charset="0"/>
+              </a:rPr>
+              <a:t>line.split</a:t>
+            </a:r>
+            <a:r>
+              <a:rPr lang="en-US" dirty="0">
+                <a:solidFill>
+                  <a:prstClr val="black"/>
+                </a:solidFill>
+                <a:latin typeface="Lucida Console" panose="020B0609040504020204" pitchFamily="49" charset="0"/>
+              </a:rPr>
+              <a:t>(1:n)[0] is alts</a:t>
+            </a:r>
+          </a:p>
+          <a:p>
+            <a:r>
+              <a:rPr lang="en-US" dirty="0">
+                <a:solidFill>
+                  <a:prstClr val="black"/>
+                </a:solidFill>
+                <a:latin typeface="Lucida Console" panose="020B0609040504020204" pitchFamily="49" charset="0"/>
+              </a:rPr>
+              <a:t>	</a:t>
+            </a:r>
+            <a:r>
+              <a:rPr lang="en-US" dirty="0" err="1">
+                <a:solidFill>
+                  <a:prstClr val="black"/>
+                </a:solidFill>
+                <a:latin typeface="Lucida Console" panose="020B0609040504020204" pitchFamily="49" charset="0"/>
+              </a:rPr>
+              <a:t>line.split</a:t>
+            </a:r>
+            <a:r>
+              <a:rPr lang="en-US" dirty="0">
+                <a:solidFill>
+                  <a:prstClr val="black"/>
+                </a:solidFill>
+                <a:latin typeface="Lucida Console" panose="020B0609040504020204" pitchFamily="49" charset="0"/>
+              </a:rPr>
+              <a:t>(1:n)[1] is refs</a:t>
+            </a:r>
+          </a:p>
+          <a:p>
+            <a:r>
+              <a:rPr lang="en-US" dirty="0">
+                <a:solidFill>
+                  <a:prstClr val="black"/>
+                </a:solidFill>
+                <a:latin typeface="Lucida Console" panose="020B0609040504020204" pitchFamily="49" charset="0"/>
+              </a:rPr>
+              <a:t>if alts &gt;= refs / 2 and alts &gt;= 1</a:t>
+            </a:r>
+          </a:p>
+          <a:p>
+            <a:r>
+              <a:rPr lang="en-US" dirty="0">
+                <a:solidFill>
+                  <a:prstClr val="black"/>
+                </a:solidFill>
+                <a:latin typeface="Lucida Console" panose="020B0609040504020204" pitchFamily="49" charset="0"/>
+              </a:rPr>
+              <a:t>	assign 1</a:t>
+            </a:r>
+          </a:p>
+          <a:p>
+            <a:r>
+              <a:rPr lang="en-US" dirty="0">
+                <a:solidFill>
+                  <a:prstClr val="black"/>
+                </a:solidFill>
+                <a:latin typeface="Lucida Console" panose="020B0609040504020204" pitchFamily="49" charset="0"/>
+              </a:rPr>
+              <a:t>else</a:t>
+            </a:r>
+          </a:p>
+          <a:p>
+            <a:r>
+              <a:rPr lang="en-US" dirty="0">
+                <a:solidFill>
+                  <a:prstClr val="black"/>
+                </a:solidFill>
+                <a:latin typeface="Lucida Console" panose="020B0609040504020204" pitchFamily="49" charset="0"/>
+              </a:rPr>
+              <a:t>	assign 0</a:t>
+            </a:r>
+          </a:p>
+          <a:p>
+            <a:endParaRPr lang="en-US" dirty="0"/>
+          </a:p>
+          <a:p>
+            <a:endParaRPr lang="en-US" dirty="0">
+              <a:latin typeface="Yu Gothic" panose="020B0400000000000000" pitchFamily="34" charset="-128"/>
+              <a:ea typeface="Yu Gothic" panose="020B0400000000000000" pitchFamily="34" charset="-128"/>
+            </a:endParaRPr>
           </a:p>
           <a:p>
             <a:r>
               <a:rPr lang="en-US" dirty="0">
                 <a:latin typeface="Yu Gothic" panose="020B0400000000000000" pitchFamily="34" charset="-128"/>
                 <a:ea typeface="Yu Gothic" panose="020B0400000000000000" pitchFamily="34" charset="-128"/>
-                <a:sym typeface="Wingdings" panose="05000000000000000000" pitchFamily="2" charset="2"/>
-              </a:rPr>
-              <a:t>Run MIDAS on downloaded data.</a:t>
+              </a:rPr>
+              <a:t>Originally, I planned to use 0, 1, 2, 3 as code for the alleles, but I don’t think this will work since</a:t>
+            </a:r>
+          </a:p>
+          <a:p>
+            <a:r>
+              <a:rPr lang="en-US" dirty="0">
+                <a:latin typeface="Yu Gothic" panose="020B0400000000000000" pitchFamily="34" charset="-128"/>
+                <a:ea typeface="Yu Gothic" panose="020B0400000000000000" pitchFamily="34" charset="-128"/>
+              </a:rPr>
+              <a:t>C and G are not between A and T in terms of value, so I decided to go with reference vs alternative</a:t>
+            </a:r>
+          </a:p>
+          <a:p>
+            <a:r>
+              <a:rPr lang="en-US" dirty="0">
+                <a:latin typeface="Yu Gothic" panose="020B0400000000000000" pitchFamily="34" charset="-128"/>
+                <a:ea typeface="Yu Gothic" panose="020B0400000000000000" pitchFamily="34" charset="-128"/>
+              </a:rPr>
+              <a:t>allele, where reference is encoded as 0 and alternative is encoded as 1.</a:t>
             </a:r>
           </a:p>
         </p:txBody>
@@ -6747,7 +7876,7 @@
     </p:spTree>
     <p:extLst>
       <p:ext uri="{BB962C8B-B14F-4D97-AF65-F5344CB8AC3E}">
-        <p14:creationId xmlns:p14="http://schemas.microsoft.com/office/powerpoint/2010/main" val="1230404432"/>
+        <p14:creationId xmlns:p14="http://schemas.microsoft.com/office/powerpoint/2010/main" val="3411083281"/>
       </p:ext>
     </p:extLst>
   </p:cSld>

</xml_diff>

<commit_message>
slides for rotation meeting.
</commit_message>
<xml_diff>
--- a/Summary/20210209_demo_for_ccgb_rotation_update.pptx
+++ b/Summary/20210209_demo_for_ccgb_rotation_update.pptx
@@ -4923,7 +4923,7 @@
         </p:blipFill>
         <p:spPr>
           <a:xfrm>
-            <a:off x="4645729" y="1501161"/>
+            <a:off x="4952974" y="1500178"/>
             <a:ext cx="6400826" cy="4351338"/>
           </a:xfrm>
         </p:spPr>
@@ -4943,7 +4943,7 @@
         <p:spPr>
           <a:xfrm>
             <a:off x="474406" y="1690688"/>
-            <a:ext cx="4302781" cy="1477328"/>
+            <a:ext cx="4302781" cy="3970318"/>
           </a:xfrm>
           <a:prstGeom prst="rect">
             <a:avLst/>
@@ -5004,7 +5004,7 @@
                 <a:latin typeface="Yu Gothic" panose="020B0400000000000000" pitchFamily="34" charset="-128"/>
                 <a:ea typeface="Yu Gothic" panose="020B0400000000000000" pitchFamily="34" charset="-128"/>
               </a:rPr>
-              <a:t>Note that this was a really sparse data</a:t>
+              <a:t>Note that this was a sparse data</a:t>
             </a:r>
           </a:p>
           <a:p>
@@ -5016,18 +5016,10 @@
                 <a:latin typeface="Yu Gothic" panose="020B0400000000000000" pitchFamily="34" charset="-128"/>
                 <a:ea typeface="Yu Gothic" panose="020B0400000000000000" pitchFamily="34" charset="-128"/>
               </a:rPr>
-              <a:t>set that I used </a:t>
-            </a:r>
-            <a:r>
-              <a:rPr lang="en-US">
-                <a:solidFill>
-                  <a:prstClr val="black"/>
-                </a:solidFill>
-                <a:latin typeface="Yu Gothic" panose="020B0400000000000000" pitchFamily="34" charset="-128"/>
-                <a:ea typeface="Yu Gothic" panose="020B0400000000000000" pitchFamily="34" charset="-128"/>
-              </a:rPr>
-              <a:t>for testing.</a:t>
-            </a:r>
+              <a:t>set that I used for testing.</a:t>
+            </a:r>
+          </a:p>
+          <a:p>
             <a:endParaRPr lang="en-US" dirty="0">
               <a:solidFill>
                 <a:prstClr val="black"/>
@@ -5035,6 +5027,159 @@
               <a:latin typeface="Yu Gothic" panose="020B0400000000000000" pitchFamily="34" charset="-128"/>
               <a:ea typeface="Yu Gothic" panose="020B0400000000000000" pitchFamily="34" charset="-128"/>
             </a:endParaRPr>
+          </a:p>
+          <a:p>
+            <a:r>
+              <a:rPr lang="en-US" dirty="0">
+                <a:solidFill>
+                  <a:prstClr val="black"/>
+                </a:solidFill>
+                <a:latin typeface="Yu Gothic" panose="020B0400000000000000" pitchFamily="34" charset="-128"/>
+                <a:ea typeface="Yu Gothic" panose="020B0400000000000000" pitchFamily="34" charset="-128"/>
+              </a:rPr>
+              <a:t>I expect to see more from higher</a:t>
+            </a:r>
+          </a:p>
+          <a:p>
+            <a:r>
+              <a:rPr lang="en-US" dirty="0">
+                <a:solidFill>
+                  <a:prstClr val="black"/>
+                </a:solidFill>
+                <a:latin typeface="Yu Gothic" panose="020B0400000000000000" pitchFamily="34" charset="-128"/>
+                <a:ea typeface="Yu Gothic" panose="020B0400000000000000" pitchFamily="34" charset="-128"/>
+              </a:rPr>
+              <a:t>density data, e.g., B. </a:t>
+            </a:r>
+            <a:r>
+              <a:rPr lang="en-US" dirty="0" err="1">
+                <a:solidFill>
+                  <a:prstClr val="black"/>
+                </a:solidFill>
+                <a:latin typeface="Yu Gothic" panose="020B0400000000000000" pitchFamily="34" charset="-128"/>
+                <a:ea typeface="Yu Gothic" panose="020B0400000000000000" pitchFamily="34" charset="-128"/>
+              </a:rPr>
+              <a:t>vulgatus</a:t>
+            </a:r>
+            <a:r>
+              <a:rPr lang="en-US" dirty="0">
+                <a:solidFill>
+                  <a:prstClr val="black"/>
+                </a:solidFill>
+                <a:latin typeface="Yu Gothic" panose="020B0400000000000000" pitchFamily="34" charset="-128"/>
+                <a:ea typeface="Yu Gothic" panose="020B0400000000000000" pitchFamily="34" charset="-128"/>
+              </a:rPr>
+              <a:t>,</a:t>
+            </a:r>
+          </a:p>
+          <a:p>
+            <a:r>
+              <a:rPr lang="en-US" dirty="0">
+                <a:solidFill>
+                  <a:prstClr val="black"/>
+                </a:solidFill>
+                <a:latin typeface="Yu Gothic" panose="020B0400000000000000" pitchFamily="34" charset="-128"/>
+                <a:ea typeface="Yu Gothic" panose="020B0400000000000000" pitchFamily="34" charset="-128"/>
+              </a:rPr>
+              <a:t>and am currently running that, but</a:t>
+            </a:r>
+          </a:p>
+          <a:p>
+            <a:r>
+              <a:rPr lang="en-US" dirty="0">
+                <a:solidFill>
+                  <a:prstClr val="black"/>
+                </a:solidFill>
+                <a:latin typeface="Yu Gothic" panose="020B0400000000000000" pitchFamily="34" charset="-128"/>
+                <a:ea typeface="Yu Gothic" panose="020B0400000000000000" pitchFamily="34" charset="-128"/>
+              </a:rPr>
+              <a:t>it will take a bit more time (</a:t>
+            </a:r>
+            <a:r>
+              <a:rPr lang="en-US" dirty="0" err="1">
+                <a:solidFill>
+                  <a:prstClr val="black"/>
+                </a:solidFill>
+                <a:latin typeface="Yu Gothic" panose="020B0400000000000000" pitchFamily="34" charset="-128"/>
+                <a:ea typeface="Yu Gothic" panose="020B0400000000000000" pitchFamily="34" charset="-128"/>
+              </a:rPr>
+              <a:t>B.vulgatus</a:t>
+            </a:r>
+            <a:endParaRPr lang="en-US" dirty="0">
+              <a:solidFill>
+                <a:prstClr val="black"/>
+              </a:solidFill>
+              <a:latin typeface="Yu Gothic" panose="020B0400000000000000" pitchFamily="34" charset="-128"/>
+              <a:ea typeface="Yu Gothic" panose="020B0400000000000000" pitchFamily="34" charset="-128"/>
+            </a:endParaRPr>
+          </a:p>
+          <a:p>
+            <a:r>
+              <a:rPr lang="en-US" dirty="0">
+                <a:solidFill>
+                  <a:prstClr val="black"/>
+                </a:solidFill>
+                <a:latin typeface="Yu Gothic" panose="020B0400000000000000" pitchFamily="34" charset="-128"/>
+                <a:ea typeface="Yu Gothic" panose="020B0400000000000000" pitchFamily="34" charset="-128"/>
+              </a:rPr>
+              <a:t>has about 200 times as much data as</a:t>
+            </a:r>
+          </a:p>
+          <a:p>
+            <a:r>
+              <a:rPr lang="en-US" dirty="0">
+                <a:solidFill>
+                  <a:prstClr val="black"/>
+                </a:solidFill>
+                <a:latin typeface="Yu Gothic" panose="020B0400000000000000" pitchFamily="34" charset="-128"/>
+                <a:ea typeface="Yu Gothic" panose="020B0400000000000000" pitchFamily="34" charset="-128"/>
+              </a:rPr>
+              <a:t>P. </a:t>
+            </a:r>
+            <a:r>
+              <a:rPr lang="en-US" dirty="0" err="1">
+                <a:solidFill>
+                  <a:prstClr val="black"/>
+                </a:solidFill>
+                <a:latin typeface="Yu Gothic" panose="020B0400000000000000" pitchFamily="34" charset="-128"/>
+                <a:ea typeface="Yu Gothic" panose="020B0400000000000000" pitchFamily="34" charset="-128"/>
+              </a:rPr>
+              <a:t>succinatutens</a:t>
+            </a:r>
+            <a:r>
+              <a:rPr lang="en-US" dirty="0">
+                <a:solidFill>
+                  <a:prstClr val="black"/>
+                </a:solidFill>
+                <a:latin typeface="Yu Gothic" panose="020B0400000000000000" pitchFamily="34" charset="-128"/>
+                <a:ea typeface="Yu Gothic" panose="020B0400000000000000" pitchFamily="34" charset="-128"/>
+              </a:rPr>
+              <a:t>). I might want to</a:t>
+            </a:r>
+          </a:p>
+          <a:p>
+            <a:r>
+              <a:rPr lang="en-US" dirty="0">
+                <a:solidFill>
+                  <a:prstClr val="black"/>
+                </a:solidFill>
+                <a:latin typeface="Yu Gothic" panose="020B0400000000000000" pitchFamily="34" charset="-128"/>
+                <a:ea typeface="Yu Gothic" panose="020B0400000000000000" pitchFamily="34" charset="-128"/>
+              </a:rPr>
+              <a:t>refactor code down the line</a:t>
+            </a:r>
+          </a:p>
+          <a:p>
+            <a:r>
+              <a:rPr lang="en-US" dirty="0">
+                <a:solidFill>
+                  <a:prstClr val="black"/>
+                </a:solidFill>
+                <a:latin typeface="Yu Gothic" panose="020B0400000000000000" pitchFamily="34" charset="-128"/>
+                <a:ea typeface="Yu Gothic" panose="020B0400000000000000" pitchFamily="34" charset="-128"/>
+              </a:rPr>
+              <a:t>to make things run faster.</a:t>
+            </a:r>
           </a:p>
         </p:txBody>
       </p:sp>
@@ -5125,7 +5270,7 @@
                 <a:ea typeface="Yu Gothic" panose="020B0400000000000000" pitchFamily="34" charset="-128"/>
                 <a:sym typeface="Wingdings" panose="05000000000000000000" pitchFamily="2" charset="2"/>
               </a:rPr>
-              <a:t>Finish implementing PCA over microbiome data</a:t>
+              <a:t>Run MIDAS on downloaded data.</a:t>
             </a:r>
           </a:p>
           <a:p>
@@ -5135,7 +5280,17 @@
                 <a:ea typeface="Yu Gothic" panose="020B0400000000000000" pitchFamily="34" charset="-128"/>
                 <a:sym typeface="Wingdings" panose="05000000000000000000" pitchFamily="2" charset="2"/>
               </a:rPr>
-              <a:t>Run MIDAS on downloaded data.</a:t>
+              <a:t>Check in with Nandita to make sure I’m using the write input</a:t>
+            </a:r>
+          </a:p>
+          <a:p>
+            <a:r>
+              <a:rPr lang="en-US" dirty="0">
+                <a:latin typeface="Yu Gothic" panose="020B0400000000000000" pitchFamily="34" charset="-128"/>
+                <a:ea typeface="Yu Gothic" panose="020B0400000000000000" pitchFamily="34" charset="-128"/>
+                <a:sym typeface="Wingdings" panose="05000000000000000000" pitchFamily="2" charset="2"/>
+              </a:rPr>
+              <a:t>Run PCA on other samples</a:t>
             </a:r>
           </a:p>
         </p:txBody>
@@ -5335,7 +5490,7 @@
           <a:p>
             <a:r>
               <a:rPr lang="en-US" dirty="0"/>
-              <a:t>N/A</a:t>
+              <a:t>Moving forward, I assume we’ll be meeting at 2:00 PM PST on Wednesdays</a:t>
             </a:r>
           </a:p>
         </p:txBody>
@@ -7670,7 +7825,7 @@
         <p:spPr>
           <a:xfrm>
             <a:off x="953728" y="1476134"/>
-            <a:ext cx="10661893" cy="3970318"/>
+            <a:ext cx="10661893" cy="4801314"/>
           </a:xfrm>
           <a:prstGeom prst="rect">
             <a:avLst/>
@@ -7690,6 +7845,25 @@
                 </a:solidFill>
                 <a:latin typeface="Lucida Console" panose="020B0609040504020204" pitchFamily="49" charset="0"/>
               </a:rPr>
+              <a:t>(Pseudocode)</a:t>
+            </a:r>
+          </a:p>
+          <a:p>
+            <a:endParaRPr lang="en-US" dirty="0">
+              <a:solidFill>
+                <a:prstClr val="black"/>
+              </a:solidFill>
+              <a:latin typeface="Lucida Console" panose="020B0609040504020204" pitchFamily="49" charset="0"/>
+            </a:endParaRPr>
+          </a:p>
+          <a:p>
+            <a:r>
+              <a:rPr lang="en-US" dirty="0">
+                <a:solidFill>
+                  <a:prstClr val="black"/>
+                </a:solidFill>
+                <a:latin typeface="Lucida Console" panose="020B0609040504020204" pitchFamily="49" charset="0"/>
+              </a:rPr>
               <a:t>For first line in input:</a:t>
             </a:r>
           </a:p>
@@ -7800,6 +7974,17 @@
                 <a:latin typeface="Lucida Console" panose="020B0609040504020204" pitchFamily="49" charset="0"/>
               </a:rPr>
               <a:t>if alts &gt;= refs / 2 and alts &gt;= 1</a:t>
+            </a:r>
+          </a:p>
+          <a:p>
+            <a:r>
+              <a:rPr lang="en-US" dirty="0">
+                <a:solidFill>
+                  <a:prstClr val="black"/>
+                </a:solidFill>
+                <a:latin typeface="Lucida Console" panose="020B0609040504020204" pitchFamily="49" charset="0"/>
+              </a:rPr>
+              <a:t>	# if more alts than refs</a:t>
             </a:r>
           </a:p>
           <a:p>

</xml_diff>